<commit_message>
Updating Final Project Code and Colab and Presentations
</commit_message>
<xml_diff>
--- a/3- Project Presentation/Final Single Stock Trading using RL agent.pptx
+++ b/3- Project Presentation/Final Single Stock Trading using RL agent.pptx
@@ -143,6 +143,7 @@
   <p1510:revLst>
     <p1510:client id="{3B6550D3-2B89-4F57-9FE3-15AB9ED01CEB}" v="859" dt="2020-12-02T01:34:21.510"/>
     <p1510:client id="{76E0305C-1E9C-46DB-AE04-9731229BA5A7}" v="50" dt="2020-12-02T02:26:54.469"/>
+    <p1510:client id="{79F32F19-F14F-479E-BC95-436D1FFD612A}" v="3" dt="2020-12-02T07:16:12.021"/>
     <p1510:client id="{8C048A29-6A0B-7817-C199-D34CC4339FCE}" v="38" dt="2020-12-02T06:05:52.362"/>
     <p1510:client id="{CD7BCC24-9EB3-4954-B5A3-8A4F95D05F89}" v="817" dt="2020-12-02T05:31:16.409"/>
   </p1510:revLst>
@@ -2269,6 +2270,61 @@
     </pc:docChg>
   </pc:docChgLst>
   <pc:docChgLst>
+    <pc:chgData name="Varun Bhaseen" userId="915dde25618e8deb" providerId="LiveId" clId="{79F32F19-F14F-479E-BC95-436D1FFD612A}"/>
+    <pc:docChg chg="custSel modSld">
+      <pc:chgData name="Varun Bhaseen" userId="915dde25618e8deb" providerId="LiveId" clId="{79F32F19-F14F-479E-BC95-436D1FFD612A}" dt="2020-12-02T07:20:48.237" v="168" actId="207"/>
+      <pc:docMkLst>
+        <pc:docMk/>
+      </pc:docMkLst>
+      <pc:sldChg chg="addSp modSp mod">
+        <pc:chgData name="Varun Bhaseen" userId="915dde25618e8deb" providerId="LiveId" clId="{79F32F19-F14F-479E-BC95-436D1FFD612A}" dt="2020-12-02T07:15:37.445" v="26" actId="207"/>
+        <pc:sldMkLst>
+          <pc:docMk/>
+          <pc:sldMk cId="4047241573" sldId="277"/>
+        </pc:sldMkLst>
+        <pc:spChg chg="add mod">
+          <ac:chgData name="Varun Bhaseen" userId="915dde25618e8deb" providerId="LiveId" clId="{79F32F19-F14F-479E-BC95-436D1FFD612A}" dt="2020-12-02T07:15:26.859" v="25" actId="115"/>
+          <ac:spMkLst>
+            <pc:docMk/>
+            <pc:sldMk cId="4047241573" sldId="277"/>
+            <ac:spMk id="2" creationId="{8F7EB6B5-FC37-45A5-998C-4AE0BD7865C5}"/>
+          </ac:spMkLst>
+        </pc:spChg>
+        <pc:spChg chg="mod">
+          <ac:chgData name="Varun Bhaseen" userId="915dde25618e8deb" providerId="LiveId" clId="{79F32F19-F14F-479E-BC95-436D1FFD612A}" dt="2020-12-02T07:14:38.350" v="12" actId="20577"/>
+          <ac:spMkLst>
+            <pc:docMk/>
+            <pc:sldMk cId="4047241573" sldId="277"/>
+            <ac:spMk id="4" creationId="{891CEDD2-606E-4AA0-B846-066C765D89A9}"/>
+          </ac:spMkLst>
+        </pc:spChg>
+        <pc:graphicFrameChg chg="mod">
+          <ac:chgData name="Varun Bhaseen" userId="915dde25618e8deb" providerId="LiveId" clId="{79F32F19-F14F-479E-BC95-436D1FFD612A}" dt="2020-12-02T07:15:37.445" v="26" actId="207"/>
+          <ac:graphicFrameMkLst>
+            <pc:docMk/>
+            <pc:sldMk cId="4047241573" sldId="277"/>
+            <ac:graphicFrameMk id="6" creationId="{215D1ED2-2276-4F00-AE52-872A08D30321}"/>
+          </ac:graphicFrameMkLst>
+        </pc:graphicFrameChg>
+      </pc:sldChg>
+      <pc:sldChg chg="modSp mod">
+        <pc:chgData name="Varun Bhaseen" userId="915dde25618e8deb" providerId="LiveId" clId="{79F32F19-F14F-479E-BC95-436D1FFD612A}" dt="2020-12-02T07:20:48.237" v="168" actId="207"/>
+        <pc:sldMkLst>
+          <pc:docMk/>
+          <pc:sldMk cId="1802730371" sldId="283"/>
+        </pc:sldMkLst>
+        <pc:graphicFrameChg chg="mod modGraphic">
+          <ac:chgData name="Varun Bhaseen" userId="915dde25618e8deb" providerId="LiveId" clId="{79F32F19-F14F-479E-BC95-436D1FFD612A}" dt="2020-12-02T07:20:48.237" v="168" actId="207"/>
+          <ac:graphicFrameMkLst>
+            <pc:docMk/>
+            <pc:sldMk cId="1802730371" sldId="283"/>
+            <ac:graphicFrameMk id="4" creationId="{29EEC8A3-502C-4FC8-A7D6-F30F525D8528}"/>
+          </ac:graphicFrameMkLst>
+        </pc:graphicFrameChg>
+      </pc:sldChg>
+    </pc:docChg>
+  </pc:docChgLst>
+  <pc:docChgLst>
     <pc:chgData name="Guest User" userId="S::urn:spo:anon#7f9434442ee06f93a2c594863940761a438721e63ca3adae4a64c32a6594575d::" providerId="AD" clId="Web-{8C048A29-6A0B-7817-C199-D34CC4339FCE}"/>
     <pc:docChg chg="modSld">
       <pc:chgData name="Guest User" userId="S::urn:spo:anon#7f9434442ee06f93a2c594863940761a438721e63ca3adae4a64c32a6594575d::" providerId="AD" clId="Web-{8C048A29-6A0B-7817-C199-D34CC4339FCE}" dt="2020-12-02T06:05:52.362" v="32"/>
@@ -12152,32 +12208,41 @@
           <a:r>
             <a:rPr lang="en-US" dirty="0" err="1">
               <a:solidFill>
-                <a:schemeClr val="tx1">
-                  <a:lumMod val="65000"/>
-                  <a:lumOff val="35000"/>
+                <a:schemeClr val="accent4">
+                  <a:lumMod val="75000"/>
                 </a:schemeClr>
               </a:solidFill>
-              <a:hlinkClick xmlns:r="http://schemas.openxmlformats.org/officeDocument/2006/relationships" r:id="rId1"/>
+              <a:hlinkClick xmlns:r="http://schemas.openxmlformats.org/officeDocument/2006/relationships" r:id="rId1">
+                <a:extLst>
+                  <a:ext uri="{A12FA001-AC4F-418D-AE19-62706E023703}">
+                    <ahyp:hlinkClr xmlns:ahyp="http://schemas.microsoft.com/office/drawing/2018/hyperlinkcolor" val="tx"/>
+                  </a:ext>
+                </a:extLst>
+              </a:hlinkClick>
             </a:rPr>
             <a:t>Github</a:t>
           </a:r>
           <a:r>
             <a:rPr lang="en-US" dirty="0">
               <a:solidFill>
-                <a:schemeClr val="tx1">
-                  <a:lumMod val="65000"/>
-                  <a:lumOff val="35000"/>
+                <a:schemeClr val="accent4">
+                  <a:lumMod val="75000"/>
                 </a:schemeClr>
               </a:solidFill>
-              <a:hlinkClick xmlns:r="http://schemas.openxmlformats.org/officeDocument/2006/relationships" r:id="rId1"/>
+              <a:hlinkClick xmlns:r="http://schemas.openxmlformats.org/officeDocument/2006/relationships" r:id="rId1">
+                <a:extLst>
+                  <a:ext uri="{A12FA001-AC4F-418D-AE19-62706E023703}">
+                    <ahyp:hlinkClr xmlns:ahyp="http://schemas.microsoft.com/office/drawing/2018/hyperlinkcolor" val="tx"/>
+                  </a:ext>
+                </a:extLst>
+              </a:hlinkClick>
             </a:rPr>
             <a:t> Link</a:t>
           </a:r>
           <a:endParaRPr lang="en-US" dirty="0">
             <a:solidFill>
-              <a:schemeClr val="tx1">
-                <a:lumMod val="65000"/>
-                <a:lumOff val="35000"/>
+              <a:schemeClr val="accent4">
+                <a:lumMod val="75000"/>
               </a:schemeClr>
             </a:solidFill>
           </a:endParaRPr>
@@ -18960,32 +19025,41 @@
           <a:r>
             <a:rPr lang="en-US" sz="3100" kern="1200" dirty="0" err="1">
               <a:solidFill>
-                <a:schemeClr val="tx1">
-                  <a:lumMod val="65000"/>
-                  <a:lumOff val="35000"/>
+                <a:schemeClr val="accent4">
+                  <a:lumMod val="75000"/>
                 </a:schemeClr>
               </a:solidFill>
-              <a:hlinkClick xmlns:r="http://schemas.openxmlformats.org/officeDocument/2006/relationships" r:id="rId2"/>
+              <a:hlinkClick xmlns:r="http://schemas.openxmlformats.org/officeDocument/2006/relationships" r:id="rId2">
+                <a:extLst>
+                  <a:ext uri="{A12FA001-AC4F-418D-AE19-62706E023703}">
+                    <ahyp:hlinkClr xmlns:ahyp="http://schemas.microsoft.com/office/drawing/2018/hyperlinkcolor" val="tx"/>
+                  </a:ext>
+                </a:extLst>
+              </a:hlinkClick>
             </a:rPr>
             <a:t>Github</a:t>
           </a:r>
           <a:r>
             <a:rPr lang="en-US" sz="3100" kern="1200" dirty="0">
               <a:solidFill>
-                <a:schemeClr val="tx1">
-                  <a:lumMod val="65000"/>
-                  <a:lumOff val="35000"/>
+                <a:schemeClr val="accent4">
+                  <a:lumMod val="75000"/>
                 </a:schemeClr>
               </a:solidFill>
-              <a:hlinkClick xmlns:r="http://schemas.openxmlformats.org/officeDocument/2006/relationships" r:id="rId2"/>
+              <a:hlinkClick xmlns:r="http://schemas.openxmlformats.org/officeDocument/2006/relationships" r:id="rId2">
+                <a:extLst>
+                  <a:ext uri="{A12FA001-AC4F-418D-AE19-62706E023703}">
+                    <ahyp:hlinkClr xmlns:ahyp="http://schemas.microsoft.com/office/drawing/2018/hyperlinkcolor" val="tx"/>
+                  </a:ext>
+                </a:extLst>
+              </a:hlinkClick>
             </a:rPr>
             <a:t> Link</a:t>
           </a:r>
           <a:endParaRPr lang="en-US" sz="3100" kern="1200" dirty="0">
             <a:solidFill>
-              <a:schemeClr val="tx1">
-                <a:lumMod val="65000"/>
-                <a:lumOff val="35000"/>
+              <a:schemeClr val="accent4">
+                <a:lumMod val="75000"/>
               </a:schemeClr>
             </a:solidFill>
           </a:endParaRPr>
@@ -40099,7 +40173,7 @@
           <a:p>
             <a:r>
               <a:rPr lang="en-US" dirty="0"/>
-              <a:t>Demo and GitHub Link</a:t>
+              <a:t>Demo and GitHub Link for the code</a:t>
             </a:r>
           </a:p>
         </p:txBody>
@@ -40120,7 +40194,7 @@
             <p:ph sz="quarter" idx="11"/>
             <p:extLst>
               <p:ext uri="{D42A27DB-BD31-4B8C-83A1-F6EECF244321}">
-                <p14:modId xmlns:p14="http://schemas.microsoft.com/office/powerpoint/2010/main" val="4060440157"/>
+                <p14:modId xmlns:p14="http://schemas.microsoft.com/office/powerpoint/2010/main" val="3434885151"/>
               </p:ext>
             </p:extLst>
           </p:nvPr>
@@ -40135,6 +40209,95 @@
           </a:graphicData>
         </a:graphic>
       </p:graphicFrame>
+      <p:sp>
+        <p:nvSpPr>
+          <p:cNvPr id="2" name="TextBox 1">
+            <a:extLst>
+              <a:ext uri="{FF2B5EF4-FFF2-40B4-BE49-F238E27FC236}">
+                <a16:creationId xmlns:a16="http://schemas.microsoft.com/office/drawing/2014/main" id="{8F7EB6B5-FC37-45A5-998C-4AE0BD7865C5}"/>
+              </a:ext>
+            </a:extLst>
+          </p:cNvPr>
+          <p:cNvSpPr txBox="1"/>
+          <p:nvPr/>
+        </p:nvSpPr>
+        <p:spPr>
+          <a:xfrm>
+            <a:off x="1935333" y="6423025"/>
+            <a:ext cx="9609938" cy="369332"/>
+          </a:xfrm>
+          <a:prstGeom prst="rect">
+            <a:avLst/>
+          </a:prstGeom>
+          <a:noFill/>
+        </p:spPr>
+        <p:txBody>
+          <a:bodyPr wrap="none" rtlCol="0">
+            <a:spAutoFit/>
+          </a:bodyPr>
+          <a:lstStyle/>
+          <a:p>
+            <a:r>
+              <a:rPr lang="en-US" dirty="0">
+                <a:solidFill>
+                  <a:schemeClr val="accent4">
+                    <a:lumMod val="75000"/>
+                  </a:schemeClr>
+                </a:solidFill>
+                <a:hlinkClick r:id="rId7">
+                  <a:extLst>
+                    <a:ext uri="{A12FA001-AC4F-418D-AE19-62706E023703}">
+                      <ahyp:hlinkClr xmlns:ahyp="http://schemas.microsoft.com/office/drawing/2018/hyperlinkcolor" val="tx"/>
+                    </a:ext>
+                  </a:extLst>
+                </a:hlinkClick>
+              </a:rPr>
+              <a:t>Link:</a:t>
+            </a:r>
+            <a:r>
+              <a:rPr lang="en-US" u="sng" dirty="0">
+                <a:solidFill>
+                  <a:schemeClr val="accent4">
+                    <a:lumMod val="75000"/>
+                  </a:schemeClr>
+                </a:solidFill>
+                <a:hlinkClick r:id="rId7">
+                  <a:extLst>
+                    <a:ext uri="{A12FA001-AC4F-418D-AE19-62706E023703}">
+                      <ahyp:hlinkClr xmlns:ahyp="http://schemas.microsoft.com/office/drawing/2018/hyperlinkcolor" val="tx"/>
+                    </a:ext>
+                  </a:extLst>
+                </a:hlinkClick>
+              </a:rPr>
+              <a:t> </a:t>
+            </a:r>
+            <a:r>
+              <a:rPr lang="en-US" dirty="0">
+                <a:solidFill>
+                  <a:schemeClr val="accent4">
+                    <a:lumMod val="75000"/>
+                  </a:schemeClr>
+                </a:solidFill>
+                <a:hlinkClick r:id="rId7">
+                  <a:extLst>
+                    <a:ext uri="{A12FA001-AC4F-418D-AE19-62706E023703}">
+                      <ahyp:hlinkClr xmlns:ahyp="http://schemas.microsoft.com/office/drawing/2018/hyperlinkcolor" val="tx"/>
+                    </a:ext>
+                  </a:extLst>
+                </a:hlinkClick>
+              </a:rPr>
+              <a:t>GPSV-Project/Reinforcement-Learning-Stock-Prediction: CMPE 297 sec 47 Project. (github.com)</a:t>
+            </a:r>
+            <a:endParaRPr lang="en-US" dirty="0">
+              <a:solidFill>
+                <a:schemeClr val="accent4">
+                  <a:lumMod val="75000"/>
+                </a:schemeClr>
+              </a:solidFill>
+            </a:endParaRPr>
+          </a:p>
+        </p:txBody>
+      </p:sp>
     </p:spTree>
     <p:extLst>
       <p:ext uri="{BB962C8B-B14F-4D97-AF65-F5344CB8AC3E}">
@@ -40209,14 +40372,14 @@
             <p:ph sz="quarter" idx="11"/>
             <p:extLst>
               <p:ext uri="{D42A27DB-BD31-4B8C-83A1-F6EECF244321}">
-                <p14:modId xmlns:p14="http://schemas.microsoft.com/office/powerpoint/2010/main" val="388324431"/>
+                <p14:modId xmlns:p14="http://schemas.microsoft.com/office/powerpoint/2010/main" val="1401075460"/>
               </p:ext>
             </p:extLst>
           </p:nvPr>
         </p:nvGraphicFramePr>
         <p:xfrm>
           <a:off x="812800" y="1600200"/>
-          <a:ext cx="10668000" cy="2651760"/>
+          <a:ext cx="10617200" cy="2651760"/>
         </p:xfrm>
         <a:graphic>
           <a:graphicData uri="http://schemas.openxmlformats.org/drawingml/2006/table">
@@ -40225,38 +40388,38 @@
                 <a:tableStyleId>{5C22544A-7EE6-4342-B048-85BDC9FD1C3A}</a:tableStyleId>
               </a:tblPr>
               <a:tblGrid>
-                <a:gridCol w="1468761">
+                <a:gridCol w="1664070">
                   <a:extLst>
                     <a:ext uri="{9D8B030D-6E8A-4147-A177-3AD203B41FA5}">
                       <a16:colId xmlns:a16="http://schemas.microsoft.com/office/drawing/2014/main" val="2546512115"/>
                     </a:ext>
                   </a:extLst>
                 </a:gridCol>
-                <a:gridCol w="2379216">
+                <a:gridCol w="2476870">
                   <a:extLst>
                     <a:ext uri="{9D8B030D-6E8A-4147-A177-3AD203B41FA5}">
                       <a16:colId xmlns:a16="http://schemas.microsoft.com/office/drawing/2014/main" val="427594243"/>
                     </a:ext>
                   </a:extLst>
                 </a:gridCol>
-                <a:gridCol w="2325949">
+                <a:gridCol w="2041864">
                   <a:extLst>
                     <a:ext uri="{9D8B030D-6E8A-4147-A177-3AD203B41FA5}">
                       <a16:colId xmlns:a16="http://schemas.microsoft.com/office/drawing/2014/main" val="3386654638"/>
                     </a:ext>
                   </a:extLst>
                 </a:gridCol>
-                <a:gridCol w="1997476">
+                <a:gridCol w="2060742">
                   <a:extLst>
                     <a:ext uri="{9D8B030D-6E8A-4147-A177-3AD203B41FA5}">
-                      <a16:colId xmlns:a16="http://schemas.microsoft.com/office/drawing/2014/main" val="3921364535"/>
+                      <a16:colId xmlns:a16="http://schemas.microsoft.com/office/drawing/2014/main" val="2034408045"/>
                     </a:ext>
                   </a:extLst>
                 </a:gridCol>
-                <a:gridCol w="2496598">
+                <a:gridCol w="2373654">
                   <a:extLst>
                     <a:ext uri="{9D8B030D-6E8A-4147-A177-3AD203B41FA5}">
-                      <a16:colId xmlns:a16="http://schemas.microsoft.com/office/drawing/2014/main" val="2034408045"/>
+                      <a16:colId xmlns:a16="http://schemas.microsoft.com/office/drawing/2014/main" val="1959192731"/>
                     </a:ext>
                   </a:extLst>
                 </a:gridCol>
@@ -40267,65 +40430,70 @@
                     <a:bodyPr/>
                     <a:lstStyle/>
                     <a:p>
+                      <a:pPr algn="ctr"/>
                       <a:r>
                         <a:rPr lang="en-US" dirty="0"/>
                         <a:t>Algorithm</a:t>
                       </a:r>
                     </a:p>
                   </a:txBody>
-                  <a:tcPr/>
+                  <a:tcPr anchor="ctr"/>
                 </a:tc>
                 <a:tc>
                   <a:txBody>
                     <a:bodyPr/>
                     <a:lstStyle/>
                     <a:p>
+                      <a:pPr algn="ctr"/>
                       <a:r>
                         <a:rPr lang="en-US" dirty="0"/>
-                        <a:t>Time to converge</a:t>
+                        <a:t>Time to converge (Minutes)</a:t>
                       </a:r>
                     </a:p>
                   </a:txBody>
-                  <a:tcPr/>
+                  <a:tcPr anchor="ctr"/>
                 </a:tc>
                 <a:tc>
                   <a:txBody>
                     <a:bodyPr/>
                     <a:lstStyle/>
                     <a:p>
+                      <a:pPr algn="ctr"/>
                       <a:r>
                         <a:rPr lang="en-US" dirty="0"/>
                         <a:t>Sharpe Ratio Metrics</a:t>
                       </a:r>
                     </a:p>
                   </a:txBody>
-                  <a:tcPr/>
+                  <a:tcPr anchor="ctr"/>
                 </a:tc>
                 <a:tc>
                   <a:txBody>
                     <a:bodyPr/>
                     <a:lstStyle/>
                     <a:p>
+                      <a:pPr algn="ctr"/>
                       <a:r>
                         <a:rPr lang="en-US" dirty="0"/>
-                        <a:t>Total Reward</a:t>
+                        <a:t>Annual return</a:t>
                       </a:r>
                     </a:p>
                   </a:txBody>
-                  <a:tcPr/>
+                  <a:tcPr anchor="ctr"/>
                 </a:tc>
                 <a:tc>
                   <a:txBody>
                     <a:bodyPr/>
                     <a:lstStyle/>
                     <a:p>
+                      <a:pPr algn="ctr"/>
                       <a:r>
                         <a:rPr lang="en-US" dirty="0"/>
-                        <a:t>Cumulative return</a:t>
+                        <a:t>Stability</a:t>
                       </a:r>
                     </a:p>
                   </a:txBody>
-                  <a:tcPr/>
+                  <a:tcPr anchor="ctr"/>
                 </a:tc>
                 <a:extLst>
                   <a:ext uri="{0D108BD9-81ED-4DB2-BD59-A6C34878D82A}">
@@ -40339,13 +40507,14 @@
                     <a:bodyPr/>
                     <a:lstStyle/>
                     <a:p>
+                      <a:pPr algn="ctr"/>
                       <a:r>
                         <a:rPr lang="en-US" dirty="0"/>
                         <a:t>A2C</a:t>
                       </a:r>
                     </a:p>
                   </a:txBody>
-                  <a:tcPr/>
+                  <a:tcPr anchor="ctr"/>
                 </a:tc>
                 <a:tc>
                   <a:txBody>
@@ -40375,22 +40544,11 @@
                         <a:buNone/>
                       </a:pPr>
                       <a:r>
-                        <a:rPr lang="en-US" sz="2400" b="0" i="0" u="none" strike="noStrike" noProof="0">
+                        <a:rPr lang="en-US" sz="2400" b="0" i="0" u="none" strike="noStrike" noProof="0" dirty="0">
                           <a:latin typeface="Calibri"/>
                         </a:rPr>
-                        <a:t>1.04</a:t>
+                        <a:t>2.29</a:t>
                       </a:r>
-                      <a:endParaRPr lang="en-US"/>
-                    </a:p>
-                  </a:txBody>
-                  <a:tcPr anchor="ctr"/>
-                </a:tc>
-                <a:tc>
-                  <a:txBody>
-                    <a:bodyPr/>
-                    <a:lstStyle/>
-                    <a:p>
-                      <a:pPr algn="ctr"/>
                       <a:endParaRPr lang="en-US" dirty="0"/>
                     </a:p>
                   </a:txBody>
@@ -40402,7 +40560,24 @@
                     <a:lstStyle/>
                     <a:p>
                       <a:pPr algn="ctr"/>
-                      <a:endParaRPr lang="en-US" dirty="0"/>
+                      <a:r>
+                        <a:rPr lang="en-US" dirty="0"/>
+                        <a:t>78.81</a:t>
+                      </a:r>
+                    </a:p>
+                  </a:txBody>
+                  <a:tcPr anchor="ctr"/>
+                </a:tc>
+                <a:tc>
+                  <a:txBody>
+                    <a:bodyPr/>
+                    <a:lstStyle/>
+                    <a:p>
+                      <a:pPr algn="ctr"/>
+                      <a:r>
+                        <a:rPr lang="en-US" dirty="0"/>
+                        <a:t>0.915</a:t>
+                      </a:r>
                     </a:p>
                   </a:txBody>
                   <a:tcPr anchor="ctr"/>
@@ -40419,77 +40594,21 @@
                     <a:bodyPr/>
                     <a:lstStyle/>
                     <a:p>
-                      <a:r>
-                        <a:rPr lang="en-US" dirty="0"/>
-                        <a:t>DQN</a:t>
-                      </a:r>
-                    </a:p>
-                  </a:txBody>
-                  <a:tcPr/>
-                </a:tc>
-                <a:tc>
-                  <a:txBody>
-                    <a:bodyPr/>
-                    <a:lstStyle/>
-                    <a:p>
                       <a:pPr algn="ctr"/>
-                      <a:endParaRPr lang="en-US" dirty="0"/>
-                    </a:p>
-                  </a:txBody>
-                  <a:tcPr anchor="ctr"/>
-                </a:tc>
-                <a:tc>
-                  <a:txBody>
-                    <a:bodyPr/>
-                    <a:lstStyle/>
-                    <a:p>
-                      <a:pPr algn="ctr"/>
-                      <a:endParaRPr lang="en-US" dirty="0"/>
-                    </a:p>
-                  </a:txBody>
-                  <a:tcPr anchor="ctr"/>
-                </a:tc>
-                <a:tc>
-                  <a:txBody>
-                    <a:bodyPr/>
-                    <a:lstStyle/>
-                    <a:p>
-                      <a:pPr algn="ctr"/>
-                      <a:endParaRPr lang="en-US" dirty="0"/>
-                    </a:p>
-                  </a:txBody>
-                  <a:tcPr anchor="ctr"/>
-                </a:tc>
-                <a:tc>
-                  <a:txBody>
-                    <a:bodyPr/>
-                    <a:lstStyle/>
-                    <a:p>
-                      <a:pPr algn="ctr"/>
-                      <a:endParaRPr lang="en-US" dirty="0"/>
-                    </a:p>
-                  </a:txBody>
-                  <a:tcPr anchor="ctr"/>
-                </a:tc>
-                <a:extLst>
-                  <a:ext uri="{0D108BD9-81ED-4DB2-BD59-A6C34878D82A}">
-                    <a16:rowId xmlns:a16="http://schemas.microsoft.com/office/drawing/2014/main" val="2571090045"/>
-                  </a:ext>
-                </a:extLst>
-              </a:tr>
-              <a:tr h="370840">
-                <a:tc>
-                  <a:txBody>
-                    <a:bodyPr/>
-                    <a:lstStyle/>
-                    <a:p>
                       <a:r>
                         <a:rPr lang="en-US" dirty="0"/>
                         <a:t>PPO</a:t>
                       </a:r>
                     </a:p>
                   </a:txBody>
-                  <a:tcPr/>
+                  <a:tcPr anchor="ctr">
+                    <a:solidFill>
+                      <a:schemeClr val="accent3">
+                        <a:lumMod val="40000"/>
+                        <a:lumOff val="60000"/>
+                      </a:schemeClr>
+                    </a:solidFill>
+                  </a:tcPr>
                 </a:tc>
                 <a:tc>
                   <a:txBody>
@@ -40508,7 +40627,14 @@
                       <a:endParaRPr lang="en-US" dirty="0"/>
                     </a:p>
                   </a:txBody>
-                  <a:tcPr anchor="ctr"/>
+                  <a:tcPr anchor="ctr">
+                    <a:solidFill>
+                      <a:schemeClr val="accent3">
+                        <a:lumMod val="40000"/>
+                        <a:lumOff val="60000"/>
+                      </a:schemeClr>
+                    </a:solidFill>
+                  </a:tcPr>
                 </a:tc>
                 <a:tc>
                   <a:txBody>
@@ -40527,7 +40653,14 @@
                       <a:endParaRPr lang="en-US" dirty="0"/>
                     </a:p>
                   </a:txBody>
-                  <a:tcPr anchor="ctr"/>
+                  <a:tcPr anchor="ctr">
+                    <a:solidFill>
+                      <a:schemeClr val="accent3">
+                        <a:lumMod val="40000"/>
+                        <a:lumOff val="60000"/>
+                      </a:schemeClr>
+                    </a:solidFill>
+                  </a:tcPr>
                 </a:tc>
                 <a:tc>
                   <a:txBody>
@@ -40541,12 +40674,19 @@
                         <a:rPr lang="en-US" sz="2400" b="0" i="0" u="none" strike="noStrike" noProof="0" dirty="0">
                           <a:latin typeface="Calibri"/>
                         </a:rPr>
-                        <a:t>191145.36</a:t>
+                        <a:t>101.10</a:t>
                       </a:r>
                       <a:endParaRPr lang="en-US" dirty="0"/>
                     </a:p>
                   </a:txBody>
-                  <a:tcPr anchor="ctr"/>
+                  <a:tcPr anchor="ctr">
+                    <a:solidFill>
+                      <a:schemeClr val="accent3">
+                        <a:lumMod val="40000"/>
+                        <a:lumOff val="60000"/>
+                      </a:schemeClr>
+                    </a:solidFill>
+                  </a:tcPr>
                 </a:tc>
                 <a:tc>
                   <a:txBody>
@@ -40557,15 +40697,19 @@
                         <a:buNone/>
                       </a:pPr>
                       <a:r>
-                        <a:rPr lang="en-US" sz="2400" b="0" i="0" u="none" strike="noStrike" noProof="0" dirty="0">
-                          <a:latin typeface="Calibri"/>
-                        </a:rPr>
-                        <a:t>1.91</a:t>
+                        <a:rPr lang="en-US" dirty="0"/>
+                        <a:t>0.908</a:t>
                       </a:r>
-                      <a:endParaRPr lang="en-US" dirty="0"/>
                     </a:p>
                   </a:txBody>
-                  <a:tcPr anchor="ctr"/>
+                  <a:tcPr anchor="ctr">
+                    <a:solidFill>
+                      <a:schemeClr val="accent3">
+                        <a:lumMod val="40000"/>
+                        <a:lumOff val="60000"/>
+                      </a:schemeClr>
+                    </a:solidFill>
+                  </a:tcPr>
                 </a:tc>
                 <a:extLst>
                   <a:ext uri="{0D108BD9-81ED-4DB2-BD59-A6C34878D82A}">
@@ -40579,13 +40723,14 @@
                     <a:bodyPr/>
                     <a:lstStyle/>
                     <a:p>
+                      <a:pPr algn="ctr"/>
                       <a:r>
                         <a:rPr lang="en-US" dirty="0"/>
                         <a:t>TRPO</a:t>
                       </a:r>
                     </a:p>
                   </a:txBody>
-                  <a:tcPr/>
+                  <a:tcPr anchor="ctr"/>
                 </a:tc>
                 <a:tc>
                   <a:txBody>
@@ -40612,26 +40757,10 @@
                     <a:lstStyle/>
                     <a:p>
                       <a:pPr algn="ctr"/>
-                      <a:endParaRPr lang="en-US" dirty="0"/>
-                    </a:p>
-                  </a:txBody>
-                  <a:tcPr anchor="ctr"/>
-                </a:tc>
-                <a:tc>
-                  <a:txBody>
-                    <a:bodyPr/>
-                    <a:lstStyle/>
-                    <a:p>
-                      <a:pPr lvl="0" algn="ctr">
-                        <a:buNone/>
-                      </a:pPr>
                       <a:r>
-                        <a:rPr lang="en-US" sz="2400" b="0" i="0" u="none" strike="noStrike" noProof="0" dirty="0">
-                          <a:latin typeface="Calibri"/>
-                        </a:rPr>
-                        <a:t>976451.53</a:t>
+                        <a:rPr lang="en-US" dirty="0"/>
+                        <a:t>1.24</a:t>
                       </a:r>
-                      <a:endParaRPr lang="en-US" dirty="0"/>
                     </a:p>
                   </a:txBody>
                   <a:tcPr anchor="ctr"/>
@@ -40642,7 +40771,24 @@
                     <a:lstStyle/>
                     <a:p>
                       <a:pPr algn="ctr"/>
-                      <a:endParaRPr lang="en-US" dirty="0"/>
+                      <a:r>
+                        <a:rPr lang="en-US" dirty="0"/>
+                        <a:t>50.14</a:t>
+                      </a:r>
+                    </a:p>
+                  </a:txBody>
+                  <a:tcPr anchor="ctr"/>
+                </a:tc>
+                <a:tc>
+                  <a:txBody>
+                    <a:bodyPr/>
+                    <a:lstStyle/>
+                    <a:p>
+                      <a:pPr algn="ctr"/>
+                      <a:r>
+                        <a:rPr lang="en-US" dirty="0"/>
+                        <a:t>0.888</a:t>
+                      </a:r>
                     </a:p>
                   </a:txBody>
                   <a:tcPr anchor="ctr"/>
@@ -40650,6 +40796,83 @@
                 <a:extLst>
                   <a:ext uri="{0D108BD9-81ED-4DB2-BD59-A6C34878D82A}">
                     <a16:rowId xmlns:a16="http://schemas.microsoft.com/office/drawing/2014/main" val="153643690"/>
+                  </a:ext>
+                </a:extLst>
+              </a:tr>
+              <a:tr h="370840">
+                <a:tc>
+                  <a:txBody>
+                    <a:bodyPr/>
+                    <a:lstStyle/>
+                    <a:p>
+                      <a:pPr algn="ctr"/>
+                      <a:r>
+                        <a:rPr lang="en-US" dirty="0"/>
+                        <a:t>DQN</a:t>
+                      </a:r>
+                    </a:p>
+                  </a:txBody>
+                  <a:tcPr anchor="ctr"/>
+                </a:tc>
+                <a:tc>
+                  <a:txBody>
+                    <a:bodyPr/>
+                    <a:lstStyle/>
+                    <a:p>
+                      <a:pPr algn="ctr"/>
+                      <a:r>
+                        <a:rPr lang="en-US" dirty="0"/>
+                        <a:t>120</a:t>
+                      </a:r>
+                    </a:p>
+                  </a:txBody>
+                  <a:tcPr anchor="ctr"/>
+                </a:tc>
+                <a:tc>
+                  <a:txBody>
+                    <a:bodyPr/>
+                    <a:lstStyle/>
+                    <a:p>
+                      <a:pPr algn="ctr"/>
+                      <a:r>
+                        <a:rPr lang="en-US" dirty="0"/>
+                        <a:t>Not Applicable</a:t>
+                      </a:r>
+                    </a:p>
+                  </a:txBody>
+                  <a:tcPr anchor="ctr"/>
+                </a:tc>
+                <a:tc>
+                  <a:txBody>
+                    <a:bodyPr/>
+                    <a:lstStyle/>
+                    <a:p>
+                      <a:pPr algn="ctr"/>
+                      <a:r>
+                        <a:rPr lang="en-US" dirty="0"/>
+                        <a:t>Not applicable</a:t>
+                      </a:r>
+                    </a:p>
+                  </a:txBody>
+                  <a:tcPr anchor="ctr"/>
+                </a:tc>
+                <a:tc>
+                  <a:txBody>
+                    <a:bodyPr/>
+                    <a:lstStyle/>
+                    <a:p>
+                      <a:pPr algn="ctr"/>
+                      <a:r>
+                        <a:rPr lang="en-US" dirty="0"/>
+                        <a:t>Not Applicable</a:t>
+                      </a:r>
+                    </a:p>
+                  </a:txBody>
+                  <a:tcPr anchor="ctr"/>
+                </a:tc>
+                <a:extLst>
+                  <a:ext uri="{0D108BD9-81ED-4DB2-BD59-A6C34878D82A}">
+                    <a16:rowId xmlns:a16="http://schemas.microsoft.com/office/drawing/2014/main" val="971495155"/>
                   </a:ext>
                 </a:extLst>
               </a:tr>

</xml_diff>